<commit_message>
Update compare number of filter
</commit_message>
<xml_diff>
--- a/thesis/Quanvolutional neural network.pptx
+++ b/thesis/Quanvolutional neural network.pptx
@@ -487,7 +487,7 @@
   </inkml:definitions>
   <inkml:trace contextRef="#ctx0" brushRef="#br0">6400 17835 0,'24'0'110,"1"0"-95,0 0-15,0 0 16,24 0-16,1 0 15,-25 0-15,24 0 0,1 0 16,49 0 0,1 0-16,-1 0 15,0 0-15,25 0 16,-25-25-16,-49 25 16,-1 0-16,51 0 15,24 0-15,-25 0 16,0 0-16,25 0 15,-49 0-15,24 0 16,0 0 0,-49 0-16,-1 0 15,-24 0-15,25 0 0,-26 0 16,1 0-16,0 0 16,0 0 15,0 0 16,-1 0 359,1 0-359,25 0-32,-25 0 1,-1 0 0,1 0-1,0 0 17</inkml:trace>
   <inkml:trace contextRef="#ctx0" brushRef="#br0" timeOffset="7696.25">2555 6921 0,'0'0'0,"-25"0"79,0 0-64,25 24 1,-25 1-16,25 25 15,-24-25 1,24-1-16,-25 26 16,25-25-16,-25 24 15,25-24-15,0 0 16,0 25 0,-25 24-16,25-49 15,0 49-15,0-49 0,-25 25 16,25 24-1,0-49-15,0 0 16,0 49-16,-24-24 16,-1 24-16,25-24 15,0 24-15,0 1 16,0-1-16,0 25 16,0-49-16,0-1 15,0 51-15,0-76 16,0 26-16,0 0 15,0 24-15,0-24 16,0-1-16,0-24 16,0 25-16,0-26 15,0 76-15,0-51 16,0-24 0,0 0-16,0 0 15,0 49 1,0-49-16,0 0 15,0 0-15,0-1 16,0 1-16,0 0 0,0 0 31,0 0-31,0-1 16,0 1-16,0 0 31,0 0-31,0 0 16,-25-1-16,0 1 15,0 25 1,1-50 0,-1 25-1,0-25 1,0 0 0,0 0-16,1 0 15,-51 0-15,50 0 16,1 0-1,-1 0 1,0 0 15,0 0-15,0 0 15,1 24 63,24 1-78,0 0-1,0 0-15,24 0 16,1-1-1,0 51-15,0-50 16,0 24-16,-25-24 0,24 0 16,1 24-1,-25-24-15,25 0 16,0 0-16,-25 25 16,0-26-16,25 1 15,-1 25-15,-24-1 16,0-24-16,25 0 15,-25 0-15,0 0 16,0-1-16,25 26 16,-25-25-16,0 24 15,25-24-15,-25 25 16,25-1 0,-25-24 15,0 25-31,0-25 15,0-1-15,0 26 16,0 0 15,24-26-31,-24 26 16,25-25-16,-25 0 16,25 24-16,-25-24 15,0 0 1,0 24-16,0 1 15,0-25-15,0 25 16,25-26-16,-25 1 16,0 25-1,0-25-15,0-1 16,0 1-16,0 0 16,0 25-1,0-1-15,0-24 16,25 49-16,-25-24 0,0-25 15,0 24 1,0-24-16,0 0 16,0 25-16,24-26 15,-24 26 1,0-25 0,0 0-16,0-1 15,0 1-15,0 0 16,0 25-16,0-26 15,0 26-15,0-25 32,0 0-32,0 24 0,0-24 15,25 25 1,-25-25 0,0-1-1,0 1 1,0 0-16,25 0 15,-25 0 1,0-1 0,0 1-16,25 0 31,-25 0-15,0 0-1,25-25-15,-25 24 16,24-24 15,1 0 16,-25 25-16,25-25-15,0 25 46,0-25-30,-1 0 14,1 0-14</inkml:trace>
-  <inkml:trace contextRef="#ctx0" brushRef="#br0" timeOffset="25818.11">10344 6896 0,'-25'0'32,"0"0"-1,0 0-16,0 0 1,1 0 0,24 25-1,0-1-15,-25 1 16,25 25-16,0-25 16,0 24-16,0 1 15,-25-1-15,25-24 16,0 25-1,-25 24-15,25-49 0,0 0 16,0 0-16,-25 24 16,25 26-16,0-51 15,0 26 1,0-25-16,0 24 16,0 1-16,0-25 15,0 0-15,0-1 16,0 1-16,0 0 15,0 0-15,0 0 16,0 49-16,0-49 16,0 0-16,0 0 15,0-1-15,0 26 16,0-25-16,0 0 16,0-1-16,0 1 15,0 0-15,0 0 16,0 0-16,0-1 15,0 1 1,0 0 0,0 0-16,0 0 15,-24-25-15,-1 24 0,25 1 16,-25 0 0,0-25-1,0 0 32,75 25 78,-50 0-125,25-25 16,0 24-1,-25 1-15,24 0 16,-24 0-16,25 0 16,-25-1-1,25 1-15,-25 0 16,0 0-1,0 24-15,0-24 16,0 0-16,25 25 16,-25-1-16,25 26 15,-25-1-15,0-24 16,0-1-16,0 1 16,0 0-16,0 24 15,0-24-15,0-1 16,0 1-1,0-1-15,0 1 16,0 0-16,0-1 16,0 1-16,0-1 0,0 1 15,0 0-15,0-1 32,0-24-32,0 50 15,0-51 1,0 26-16,0-25 15,0 0-15,0-1 16,0 26-16,49-25 16,-49 0-1,25-1 1,-25 1-16,25-25 31,-25 25-15</inkml:trace>
+  <inkml:trace contextRef="#ctx0" brushRef="#br0" timeOffset="25818.1">10344 6896 0,'-25'0'32,"0"0"-1,0 0-16,0 0 1,1 0 0,24 25-1,0-1-15,-25 1 16,25 25-16,0-25 16,0 24-16,0 1 15,-25-1-15,25-24 16,0 25-1,-25 24-15,25-49 0,0 0 16,0 0-16,-25 24 16,25 26-16,0-51 15,0 26 1,0-25-16,0 24 16,0 1-16,0-25 15,0 0-15,0-1 16,0 1-16,0 0 15,0 0-15,0 0 16,0 49-16,0-49 16,0 0-16,0 0 15,0-1-15,0 26 16,0-25-16,0 0 16,0-1-16,0 1 15,0 0-15,0 0 16,0 0-16,0-1 15,0 1 1,0 0 0,0 0-16,0 0 15,-24-25-15,-1 24 0,25 1 16,-25 0 0,0-25-1,0 0 32,75 25 78,-50 0-125,25-25 16,0 24-1,-25 1-15,24 0 16,-24 0-16,25 0 16,-25-1-1,25 1-15,-25 0 16,0 0-1,0 24-15,0-24 16,0 0-16,25 25 16,-25-1-16,25 26 15,-25-1-15,0-24 16,0-1-16,0 1 16,0 0-16,0 24 15,0-24-15,0-1 16,0 1-1,0-1-15,0 1 16,0 0-16,0-1 16,0 1-16,0-1 0,0 1 15,0 0-15,0-1 32,0-24-32,0 50 15,0-51 1,0 26-16,0-25 15,0 0-15,0-1 16,0 26-16,49-25 16,-49 0-1,25-1 1,-25 1-16,25-25 31,-25 25-15</inkml:trace>
   <inkml:trace contextRef="#ctx0" brushRef="#br0" timeOffset="49231.78">5904 17338 0,'0'-24'16,"0"-1"15,0 0-31,0 0 31,0 0-15,0-24 15,0 24 1,0 0-17,0 0 16,24 1-15,1-1-16,0 0 31,25 25-15,-50-25 0,24 25-16,1 0 15,0 0 1,0 0-1,0 0-15,-1 0 16,26 0-16,0 0 16,-26 0-1,-24 25 1,50-25-16,0 50 0,-26-26 16,26 1-1,-25-25-15,0 25 0,24 0 16,-24 0-16,0-25 15,0 24 1,-25 1 0,24-25-16,1 25 15,-25 0 17,25 0-17,-25-1 16,0 1-31,0 25 16,0-25-16,0 49 16,0-49-1,0 0-15,0 0 16,0-1-16,0 1 16,0 0-1,-25 25-15,25-26 16,-49-24-16,49 25 15,-25-25-15,0 25 16,0-25-16,0 25 16,-24-25-16,-26 0 15,26 0-15,-1 0 16,-24 0-16,49 0 16,0 0-16,0 0 15,1 0-15</inkml:trace>
   <inkml:trace contextRef="#ctx0" brushRef="#br0" timeOffset="60842.27">23614 7565 0,'0'50'31,"-50"24"-15,26 26-16,-76 24 16,76-75-16,-26 26 0,-24 74 15,-50 49 1,-50 50-16,-49 74 16,24 51-16,-24-1 15,0-50-15,49 1 16,25-100-16,0 0 15,25-25-15,-24 26 16,-26-26-16,0 1 16,1-26-16,-1-24 15,0-50 1,50-49-16,0-25 0,50-25 16,0 0-16,24 0 15</inkml:trace>
   <inkml:trace contextRef="#ctx0" brushRef="#br0" timeOffset="61313.92">20439 7417 0,'0'0'0,"50"24"0,-1 51 15,26 49 1,24 25-16,50 24 0,49 26 16,25 74-1,-49-50-15,49 25 16,1 50-16,48-50 16,-24 0-16,25 49 15,50 51-15,-1 24 16,-74-50-16,0-24 15,-24-25-15,24 24 16,-100-74-16,1 1 16,-50-75-16,1-50 15</inkml:trace>
@@ -606,7 +606,7 @@
           <a:p>
             <a:fld id="{C713C089-A006-49EC-A57B-51E39300CD8B}" type="datetimeFigureOut">
               <a:rPr lang="vi-VN" smtClean="0"/>
-              <a:t>20/08/2022</a:t>
+              <a:t>05/09/2022</a:t>
             </a:fld>
             <a:endParaRPr lang="vi-VN"/>
           </a:p>
@@ -1020,7 +1020,7 @@
           <a:p>
             <a:fld id="{79A0D75B-382B-44F1-95AD-65E71C3FFDF2}" type="datetime1">
               <a:rPr lang="vi-VN" smtClean="0"/>
-              <a:t>20/08/2022</a:t>
+              <a:t>05/09/2022</a:t>
             </a:fld>
             <a:endParaRPr lang="vi-VN"/>
           </a:p>
@@ -1218,7 +1218,7 @@
           <a:p>
             <a:fld id="{EF91B0C2-1DC0-4DA6-B6E3-3AB131C5DF69}" type="datetime1">
               <a:rPr lang="vi-VN" smtClean="0"/>
-              <a:t>20/08/2022</a:t>
+              <a:t>05/09/2022</a:t>
             </a:fld>
             <a:endParaRPr lang="vi-VN"/>
           </a:p>
@@ -1426,7 +1426,7 @@
           <a:p>
             <a:fld id="{E5A84FD5-1303-4CA3-ADA5-7736F53F9041}" type="datetime1">
               <a:rPr lang="vi-VN" smtClean="0"/>
-              <a:t>20/08/2022</a:t>
+              <a:t>05/09/2022</a:t>
             </a:fld>
             <a:endParaRPr lang="vi-VN"/>
           </a:p>
@@ -1624,7 +1624,7 @@
           <a:p>
             <a:fld id="{B6814BC3-EFEE-4CE9-96F6-461933B4C9B3}" type="datetime1">
               <a:rPr lang="vi-VN" smtClean="0"/>
-              <a:t>20/08/2022</a:t>
+              <a:t>05/09/2022</a:t>
             </a:fld>
             <a:endParaRPr lang="vi-VN"/>
           </a:p>
@@ -1899,7 +1899,7 @@
           <a:p>
             <a:fld id="{D685A125-1797-4A1F-B73C-042C34C130AE}" type="datetime1">
               <a:rPr lang="vi-VN" smtClean="0"/>
-              <a:t>20/08/2022</a:t>
+              <a:t>05/09/2022</a:t>
             </a:fld>
             <a:endParaRPr lang="vi-VN"/>
           </a:p>
@@ -2164,7 +2164,7 @@
           <a:p>
             <a:fld id="{A73AC773-7551-4A21-8CD9-725D1D0E13D4}" type="datetime1">
               <a:rPr lang="vi-VN" smtClean="0"/>
-              <a:t>20/08/2022</a:t>
+              <a:t>05/09/2022</a:t>
             </a:fld>
             <a:endParaRPr lang="vi-VN"/>
           </a:p>
@@ -2576,7 +2576,7 @@
           <a:p>
             <a:fld id="{6A2BF65D-F379-40CD-8A40-B3417345A7D0}" type="datetime1">
               <a:rPr lang="vi-VN" smtClean="0"/>
-              <a:t>20/08/2022</a:t>
+              <a:t>05/09/2022</a:t>
             </a:fld>
             <a:endParaRPr lang="vi-VN"/>
           </a:p>
@@ -2717,7 +2717,7 @@
           <a:p>
             <a:fld id="{4973F540-CEFB-4C74-8464-337235A29738}" type="datetime1">
               <a:rPr lang="vi-VN" smtClean="0"/>
-              <a:t>20/08/2022</a:t>
+              <a:t>05/09/2022</a:t>
             </a:fld>
             <a:endParaRPr lang="vi-VN"/>
           </a:p>
@@ -2830,7 +2830,7 @@
           <a:p>
             <a:fld id="{DD4E0017-27D1-4ABF-9EB5-1031ABAE9439}" type="datetime1">
               <a:rPr lang="vi-VN" smtClean="0"/>
-              <a:t>20/08/2022</a:t>
+              <a:t>05/09/2022</a:t>
             </a:fld>
             <a:endParaRPr lang="vi-VN"/>
           </a:p>
@@ -3141,7 +3141,7 @@
           <a:p>
             <a:fld id="{53E46112-6ACE-4A63-B1D7-5B3B6755E5A6}" type="datetime1">
               <a:rPr lang="vi-VN" smtClean="0"/>
-              <a:t>20/08/2022</a:t>
+              <a:t>05/09/2022</a:t>
             </a:fld>
             <a:endParaRPr lang="vi-VN"/>
           </a:p>
@@ -3429,7 +3429,7 @@
           <a:p>
             <a:fld id="{580E5B30-9BCE-45A0-AF9E-8FC72FE581AC}" type="datetime1">
               <a:rPr lang="vi-VN" smtClean="0"/>
-              <a:t>20/08/2022</a:t>
+              <a:t>05/09/2022</a:t>
             </a:fld>
             <a:endParaRPr lang="vi-VN"/>
           </a:p>
@@ -3670,7 +3670,7 @@
           <a:p>
             <a:fld id="{5DF12F3C-C493-42D5-9F6C-9A56AA909FBF}" type="datetime1">
               <a:rPr lang="vi-VN" smtClean="0"/>
-              <a:t>20/08/2022</a:t>
+              <a:t>05/09/2022</a:t>
             </a:fld>
             <a:endParaRPr lang="vi-VN"/>
           </a:p>
@@ -4313,19 +4313,7 @@
                       <a:rPr lang="en-US" i="1" smtClean="0">
                         <a:latin typeface="Cambria Math" panose="02040503050406030204" pitchFamily="18" charset="0"/>
                       </a:rPr>
-                      <m:t>0</m:t>
-                    </m:r>
-                    <m:r>
-                      <a:rPr lang="en-US" i="1" smtClean="0">
-                        <a:latin typeface="Cambria Math" panose="02040503050406030204" pitchFamily="18" charset="0"/>
-                      </a:rPr>
-                      <m:t>→</m:t>
-                    </m:r>
-                    <m:r>
-                      <a:rPr lang="en-US" i="1" smtClean="0">
-                        <a:latin typeface="Cambria Math" panose="02040503050406030204" pitchFamily="18" charset="0"/>
-                      </a:rPr>
-                      <m:t>2</m:t>
+                      <m:t>0→2</m:t>
                     </m:r>
                     <m:sSup>
                       <m:sSupPr>
@@ -4573,19 +4561,7 @@
                           <a:rPr lang="en-US" b="0" i="1" smtClean="0">
                             <a:latin typeface="Cambria Math" panose="02040503050406030204" pitchFamily="18" charset="0"/>
                           </a:rPr>
-                          <m:t>0</m:t>
-                        </m:r>
-                        <m:r>
-                          <a:rPr lang="en-US" b="0" i="1" smtClean="0">
-                            <a:latin typeface="Cambria Math" panose="02040503050406030204" pitchFamily="18" charset="0"/>
-                          </a:rPr>
-                          <m:t>,</m:t>
-                        </m:r>
-                        <m:r>
-                          <a:rPr lang="en-US" b="0" i="1" smtClean="0">
-                            <a:latin typeface="Cambria Math" panose="02040503050406030204" pitchFamily="18" charset="0"/>
-                          </a:rPr>
-                          <m:t>2</m:t>
+                          <m:t>0,2</m:t>
                         </m:r>
                         <m:r>
                           <a:rPr lang="en-US" b="0" i="1" smtClean="0">
@@ -7358,8 +7334,8 @@
           </a:p>
         </p:txBody>
       </p:sp>
-      <mc:AlternateContent xmlns:mc="http://schemas.openxmlformats.org/markup-compatibility/2006">
-        <mc:Choice xmlns:p14="http://schemas.microsoft.com/office/powerpoint/2010/main" Requires="p14">
+      <mc:AlternateContent xmlns:mc="http://schemas.openxmlformats.org/markup-compatibility/2006" xmlns:p14="http://schemas.microsoft.com/office/powerpoint/2010/main">
+        <mc:Choice Requires="p14">
           <p:contentPart p14:bwMode="auto" r:id="rId4">
             <p14:nvContentPartPr>
               <p14:cNvPr id="3" name="Viết tay 2">
@@ -7378,7 +7354,7 @@
             </p14:xfrm>
           </p:contentPart>
         </mc:Choice>
-        <mc:Fallback>
+        <mc:Fallback xmlns="">
           <p:pic>
             <p:nvPicPr>
               <p:cNvPr id="3" name="Viết tay 2">
@@ -7905,8 +7881,8 @@
           </a:p>
         </p:txBody>
       </p:sp>
-      <mc:AlternateContent xmlns:mc="http://schemas.openxmlformats.org/markup-compatibility/2006">
-        <mc:Choice xmlns:a14="http://schemas.microsoft.com/office/drawing/2010/main" Requires="a14">
+      <mc:AlternateContent xmlns:mc="http://schemas.openxmlformats.org/markup-compatibility/2006" xmlns:a14="http://schemas.microsoft.com/office/drawing/2010/main">
+        <mc:Choice Requires="a14">
           <p:sp>
             <p:nvSpPr>
               <p:cNvPr id="11" name="Hộp Văn bản 10">
@@ -7976,7 +7952,7 @@
             </p:txBody>
           </p:sp>
         </mc:Choice>
-        <mc:Fallback>
+        <mc:Fallback xmlns="">
           <p:sp>
             <p:nvSpPr>
               <p:cNvPr id="11" name="Hộp Văn bản 10">
@@ -8249,13 +8225,7 @@
                                         <a:rPr lang="vi-VN" sz="2800" b="0" i="1" smtClean="0">
                                           <a:latin typeface="Cambria Math" panose="02040503050406030204" pitchFamily="18" charset="0"/>
                                         </a:rPr>
-                                        <m:t>.</m:t>
-                                      </m:r>
-                                      <m:r>
-                                        <a:rPr lang="vi-VN" sz="2800" b="0" i="1" smtClean="0">
-                                          <a:latin typeface="Cambria Math" panose="02040503050406030204" pitchFamily="18" charset="0"/>
-                                        </a:rPr>
-                                        <m:t>77</m:t>
+                                        <m:t>.77</m:t>
                                       </m:r>
                                     </m:e>
                                   </m:mr>
@@ -8265,19 +8235,7 @@
                                         <a:rPr lang="vi-VN" sz="2800" b="0" i="1" smtClean="0">
                                           <a:latin typeface="Cambria Math" panose="02040503050406030204" pitchFamily="18" charset="0"/>
                                         </a:rPr>
-                                        <m:t>0</m:t>
-                                      </m:r>
-                                      <m:r>
-                                        <a:rPr lang="vi-VN" sz="2800" b="0" i="1" smtClean="0">
-                                          <a:latin typeface="Cambria Math" panose="02040503050406030204" pitchFamily="18" charset="0"/>
-                                        </a:rPr>
-                                        <m:t>.</m:t>
-                                      </m:r>
-                                      <m:r>
-                                        <a:rPr lang="vi-VN" sz="2800" b="0" i="1" smtClean="0">
-                                          <a:latin typeface="Cambria Math" panose="02040503050406030204" pitchFamily="18" charset="0"/>
-                                        </a:rPr>
-                                        <m:t>61</m:t>
+                                        <m:t>0.61</m:t>
                                       </m:r>
                                     </m:e>
                                   </m:mr>
@@ -8300,19 +8258,7 @@
                                   <a:rPr lang="vi-VN" sz="2800" b="0" i="1" smtClean="0">
                                     <a:latin typeface="Cambria Math" panose="02040503050406030204" pitchFamily="18" charset="0"/>
                                   </a:rPr>
-                                  <m:t>0</m:t>
-                                </m:r>
-                                <m:r>
-                                  <a:rPr lang="vi-VN" sz="2800" b="0" i="1" smtClean="0">
-                                    <a:latin typeface="Cambria Math" panose="02040503050406030204" pitchFamily="18" charset="0"/>
-                                  </a:rPr>
-                                  <m:t>.</m:t>
-                                </m:r>
-                                <m:r>
-                                  <a:rPr lang="vi-VN" sz="2800" b="0" i="1" smtClean="0">
-                                    <a:latin typeface="Cambria Math" panose="02040503050406030204" pitchFamily="18" charset="0"/>
-                                  </a:rPr>
-                                  <m:t>71</m:t>
+                                  <m:t>0.71</m:t>
                                 </m:r>
                               </m:e>
                             </m:mr>
@@ -8442,8 +8388,8 @@
           </a:p>
         </p:txBody>
       </p:sp>
-      <mc:AlternateContent xmlns:mc="http://schemas.openxmlformats.org/markup-compatibility/2006">
-        <mc:Choice xmlns:p14="http://schemas.microsoft.com/office/powerpoint/2010/main" Requires="p14">
+      <mc:AlternateContent xmlns:mc="http://schemas.openxmlformats.org/markup-compatibility/2006" xmlns:p14="http://schemas.microsoft.com/office/powerpoint/2010/main">
+        <mc:Choice Requires="p14">
           <p:contentPart p14:bwMode="auto" r:id="rId7">
             <p14:nvContentPartPr>
               <p14:cNvPr id="15" name="Viết tay 14">
@@ -8462,7 +8408,7 @@
             </p14:xfrm>
           </p:contentPart>
         </mc:Choice>
-        <mc:Fallback>
+        <mc:Fallback xmlns="">
           <p:pic>
             <p:nvPicPr>
               <p:cNvPr id="15" name="Viết tay 14">
@@ -8832,8 +8778,8 @@
           </a:p>
         </p:txBody>
       </p:sp>
-      <mc:AlternateContent xmlns:mc="http://schemas.openxmlformats.org/markup-compatibility/2006">
-        <mc:Choice xmlns:p14="http://schemas.microsoft.com/office/powerpoint/2010/main" Requires="p14">
+      <mc:AlternateContent xmlns:mc="http://schemas.openxmlformats.org/markup-compatibility/2006" xmlns:p14="http://schemas.microsoft.com/office/powerpoint/2010/main">
+        <mc:Choice Requires="p14">
           <p:contentPart p14:bwMode="auto" r:id="rId2">
             <p14:nvContentPartPr>
               <p14:cNvPr id="5" name="Viết tay 4">
@@ -8852,7 +8798,7 @@
             </p14:xfrm>
           </p:contentPart>
         </mc:Choice>
-        <mc:Fallback>
+        <mc:Fallback xmlns="">
           <p:pic>
             <p:nvPicPr>
               <p:cNvPr id="5" name="Viết tay 4">
@@ -9450,8 +9396,8 @@
           </a:p>
         </p:txBody>
       </p:sp>
-      <mc:AlternateContent xmlns:mc="http://schemas.openxmlformats.org/markup-compatibility/2006">
-        <mc:Choice xmlns:p14="http://schemas.microsoft.com/office/powerpoint/2010/main" Requires="p14">
+      <mc:AlternateContent xmlns:mc="http://schemas.openxmlformats.org/markup-compatibility/2006" xmlns:p14="http://schemas.microsoft.com/office/powerpoint/2010/main">
+        <mc:Choice Requires="p14">
           <p:contentPart p14:bwMode="auto" r:id="rId4">
             <p14:nvContentPartPr>
               <p14:cNvPr id="3" name="Viết tay 2">
@@ -9470,7 +9416,7 @@
             </p14:xfrm>
           </p:contentPart>
         </mc:Choice>
-        <mc:Fallback>
+        <mc:Fallback xmlns="">
           <p:pic>
             <p:nvPicPr>
               <p:cNvPr id="3" name="Viết tay 2">
@@ -13790,19 +13736,7 @@
                       <a:rPr lang="en-US" b="0" i="1" smtClean="0">
                         <a:latin typeface="Cambria Math" panose="02040503050406030204" pitchFamily="18" charset="0"/>
                       </a:rPr>
-                      <m:t>|</m:t>
-                    </m:r>
-                    <m:r>
-                      <a:rPr lang="en-US" b="0" i="1" smtClean="0">
-                        <a:latin typeface="Cambria Math" panose="02040503050406030204" pitchFamily="18" charset="0"/>
-                      </a:rPr>
-                      <m:t>0</m:t>
-                    </m:r>
-                    <m:r>
-                      <a:rPr lang="en-US" b="0" i="1" smtClean="0">
-                        <a:latin typeface="Cambria Math" panose="02040503050406030204" pitchFamily="18" charset="0"/>
-                      </a:rPr>
-                      <m:t>⟩</m:t>
+                      <m:t>|0⟩</m:t>
                     </m:r>
                   </m:oMath>
                 </a14:m>

</xml_diff>